<commit_message>
Update Loesungen und Hilfe
Erweiterung der Aufgabenstellung und Loesungen in einer Didaktischen Reihe mit Erweiterung der Aufgaben
</commit_message>
<xml_diff>
--- a/Lass_die_Wuerfel_Rollen/Lass_die_Wuerfel_rollen.pptx
+++ b/Lass_die_Wuerfel_Rollen/Lass_die_Wuerfel_rollen.pptx
@@ -5,11 +5,12 @@
     <p:sldMasterId id="2147483660" r:id="rId1"/>
   </p:sldMasterIdLst>
   <p:notesMasterIdLst>
-    <p:notesMasterId r:id="rId4"/>
+    <p:notesMasterId r:id="rId5"/>
   </p:notesMasterIdLst>
   <p:sldIdLst>
     <p:sldId id="284" r:id="rId2"/>
-    <p:sldId id="285" r:id="rId3"/>
+    <p:sldId id="286" r:id="rId3"/>
+    <p:sldId id="285" r:id="rId4"/>
   </p:sldIdLst>
   <p:sldSz cx="6858000" cy="9906000" type="A4"/>
   <p:notesSz cx="6858000" cy="9144000"/>
@@ -201,7 +202,7 @@
           <a:p>
             <a:fld id="{DD7A25D8-F173-4133-85F8-CB962D678EB5}" type="datetimeFigureOut">
               <a:rPr lang="de-DE" smtClean="0"/>
-              <a:t>12.03.2020</a:t>
+              <a:t>09.11.2021</a:t>
             </a:fld>
             <a:endParaRPr lang="de-DE"/>
           </a:p>
@@ -599,7 +600,7 @@
           <a:p>
             <a:fld id="{FC9269F9-6F79-4414-A84E-D81C6C443C37}" type="datetimeFigureOut">
               <a:rPr lang="de-DE" smtClean="0"/>
-              <a:t>12.03.2020</a:t>
+              <a:t>09.11.2021</a:t>
             </a:fld>
             <a:endParaRPr lang="de-DE"/>
           </a:p>
@@ -1890,7 +1891,7 @@
           <a:p>
             <a:fld id="{FC9269F9-6F79-4414-A84E-D81C6C443C37}" type="datetimeFigureOut">
               <a:rPr lang="de-DE" smtClean="0"/>
-              <a:t>12.03.2020</a:t>
+              <a:t>09.11.2021</a:t>
             </a:fld>
             <a:endParaRPr lang="de-DE"/>
           </a:p>
@@ -2460,7 +2461,7 @@
           <a:p>
             <a:fld id="{FC9269F9-6F79-4414-A84E-D81C6C443C37}" type="datetimeFigureOut">
               <a:rPr lang="de-DE" smtClean="0"/>
-              <a:t>12.03.2020</a:t>
+              <a:t>09.11.2021</a:t>
             </a:fld>
             <a:endParaRPr lang="de-DE"/>
           </a:p>
@@ -3469,7 +3470,7 @@
           <a:p>
             <a:fld id="{FC9269F9-6F79-4414-A84E-D81C6C443C37}" type="datetimeFigureOut">
               <a:rPr lang="de-DE" smtClean="0"/>
-              <a:t>12.03.2020</a:t>
+              <a:t>09.11.2021</a:t>
             </a:fld>
             <a:endParaRPr lang="de-DE"/>
           </a:p>
@@ -3835,7 +3836,7 @@
           <a:p>
             <a:fld id="{FC9269F9-6F79-4414-A84E-D81C6C443C37}" type="datetimeFigureOut">
               <a:rPr lang="de-DE" smtClean="0"/>
-              <a:t>12.03.2020</a:t>
+              <a:t>09.11.2021</a:t>
             </a:fld>
             <a:endParaRPr lang="de-DE"/>
           </a:p>
@@ -4191,7 +4192,7 @@
           <a:p>
             <a:fld id="{FC9269F9-6F79-4414-A84E-D81C6C443C37}" type="datetimeFigureOut">
               <a:rPr lang="de-DE" smtClean="0"/>
-              <a:t>12.03.2020</a:t>
+              <a:t>09.11.2021</a:t>
             </a:fld>
             <a:endParaRPr lang="de-DE"/>
           </a:p>
@@ -4774,7 +4775,12 @@
             <p:ph sz="quarter" idx="14"/>
           </p:nvPr>
         </p:nvSpPr>
-        <p:spPr/>
+        <p:spPr>
+          <a:xfrm>
+            <a:off x="847825" y="7969250"/>
+            <a:ext cx="5184675" cy="924791"/>
+          </a:xfrm>
+        </p:spPr>
         <p:txBody>
           <a:bodyPr>
             <a:normAutofit lnSpcReduction="10000"/>
@@ -4783,7 +4789,15 @@
           <a:p>
             <a:r>
               <a:rPr lang="de-DE" dirty="0"/>
-              <a:t>Lass auf der LED-Matrix die Würfelwerte von 1 bis 6 wie bei einem echten Würfel anzeigen. Am Ende soll ein zufälliges Würfelergebnis angezeigt werden.</a:t>
+              <a:t>Programmiere einen elektronischen Würfel auf dem </a:t>
+            </a:r>
+            <a:r>
+              <a:rPr lang="de-DE" dirty="0" err="1"/>
+              <a:t>Calliope</a:t>
+            </a:r>
+            <a:r>
+              <a:rPr lang="de-DE" dirty="0"/>
+              <a:t>, der die Zahlen 1 bis 6 anzeigt. Erweitere das Programm so, dass du das Würfelergebnis beeinflussen kannst (immer 6 würfeln). </a:t>
             </a:r>
           </a:p>
         </p:txBody>
@@ -4940,6 +4954,225 @@
 </file>
 
 <file path=ppt/slides/slide2.xml><?xml version="1.0" encoding="utf-8"?>
+<p:sld xmlns:a="http://schemas.openxmlformats.org/drawingml/2006/main" xmlns:r="http://schemas.openxmlformats.org/officeDocument/2006/relationships" xmlns:p="http://schemas.openxmlformats.org/presentationml/2006/main">
+  <p:cSld>
+    <p:spTree>
+      <p:nvGrpSpPr>
+        <p:cNvPr id="1" name=""/>
+        <p:cNvGrpSpPr/>
+        <p:nvPr/>
+      </p:nvGrpSpPr>
+      <p:grpSpPr>
+        <a:xfrm>
+          <a:off x="0" y="0"/>
+          <a:ext cx="0" cy="0"/>
+          <a:chOff x="0" y="0"/>
+          <a:chExt cx="0" cy="0"/>
+        </a:xfrm>
+      </p:grpSpPr>
+      <p:sp>
+        <p:nvSpPr>
+          <p:cNvPr id="2" name="Titel 1"/>
+          <p:cNvSpPr>
+            <a:spLocks noGrp="1"/>
+          </p:cNvSpPr>
+          <p:nvPr>
+            <p:ph type="title"/>
+          </p:nvPr>
+        </p:nvSpPr>
+        <p:spPr/>
+        <p:txBody>
+          <a:bodyPr/>
+          <a:lstStyle/>
+          <a:p>
+            <a:r>
+              <a:rPr lang="de-DE" dirty="0"/>
+              <a:t>Lasst die Würfel rollen II</a:t>
+            </a:r>
+          </a:p>
+        </p:txBody>
+      </p:sp>
+      <p:sp>
+        <p:nvSpPr>
+          <p:cNvPr id="4" name="Inhaltsplatzhalter 3"/>
+          <p:cNvSpPr>
+            <a:spLocks noGrp="1"/>
+          </p:cNvSpPr>
+          <p:nvPr>
+            <p:ph sz="quarter" idx="14"/>
+          </p:nvPr>
+        </p:nvSpPr>
+        <p:spPr>
+          <a:xfrm>
+            <a:off x="847825" y="7969250"/>
+            <a:ext cx="5032275" cy="924791"/>
+          </a:xfrm>
+        </p:spPr>
+        <p:txBody>
+          <a:bodyPr>
+            <a:normAutofit lnSpcReduction="10000"/>
+          </a:bodyPr>
+          <a:lstStyle/>
+          <a:p>
+            <a:r>
+              <a:rPr lang="de-DE" dirty="0"/>
+              <a:t>Gestalte die Anzeige der Zahl so, dass sie wie auf einem richtigen Würfel aussieht. Erweitere das Programm um eine Würfelanimation. In der verschiedene Zahlen angezeigt werden, bis der Würfel „liegen bleibt“.</a:t>
+            </a:r>
+          </a:p>
+        </p:txBody>
+      </p:sp>
+      <p:sp>
+        <p:nvSpPr>
+          <p:cNvPr id="5" name="Textplatzhalter 4"/>
+          <p:cNvSpPr>
+            <a:spLocks noGrp="1"/>
+          </p:cNvSpPr>
+          <p:nvPr>
+            <p:ph type="body" sz="quarter" idx="15"/>
+          </p:nvPr>
+        </p:nvSpPr>
+        <p:spPr/>
+        <p:txBody>
+          <a:bodyPr/>
+          <a:lstStyle/>
+          <a:p>
+            <a:r>
+              <a:rPr lang="de-DE" dirty="0"/>
+              <a:t>Für Fortgeschrittene</a:t>
+            </a:r>
+          </a:p>
+          <a:p>
+            <a:endParaRPr lang="de-DE" dirty="0"/>
+          </a:p>
+        </p:txBody>
+      </p:sp>
+      <p:sp>
+        <p:nvSpPr>
+          <p:cNvPr id="6" name="Textplatzhalter 5"/>
+          <p:cNvSpPr>
+            <a:spLocks noGrp="1"/>
+          </p:cNvSpPr>
+          <p:nvPr>
+            <p:ph type="body" sz="quarter" idx="16"/>
+          </p:nvPr>
+        </p:nvSpPr>
+        <p:spPr/>
+        <p:txBody>
+          <a:bodyPr/>
+          <a:lstStyle/>
+          <a:p>
+            <a:endParaRPr lang="de-DE" dirty="0"/>
+          </a:p>
+        </p:txBody>
+      </p:sp>
+      <p:pic>
+        <p:nvPicPr>
+          <p:cNvPr id="11" name="Bildplatzhalter 10"/>
+          <p:cNvPicPr>
+            <a:picLocks noGrp="1" noChangeAspect="1"/>
+          </p:cNvPicPr>
+          <p:nvPr>
+            <p:ph type="pic" sz="quarter" idx="13"/>
+          </p:nvPr>
+        </p:nvPicPr>
+        <p:blipFill>
+          <a:blip r:embed="rId2">
+            <a:extLst>
+              <a:ext uri="{28A0092B-C50C-407E-A947-70E740481C1C}">
+                <a14:useLocalDpi xmlns:a14="http://schemas.microsoft.com/office/drawing/2010/main" val="0"/>
+              </a:ext>
+            </a:extLst>
+          </a:blip>
+          <a:srcRect t="1030" b="1030"/>
+          <a:stretch>
+            <a:fillRect/>
+          </a:stretch>
+        </p:blipFill>
+        <p:spPr/>
+      </p:pic>
+      <p:pic>
+        <p:nvPicPr>
+          <p:cNvPr id="3" name="Grafik 2">
+            <a:extLst>
+              <a:ext uri="{FF2B5EF4-FFF2-40B4-BE49-F238E27FC236}">
+                <a16:creationId xmlns:a16="http://schemas.microsoft.com/office/drawing/2014/main" id="{8459CF46-FBBE-45EE-B216-B51140BDBD3A}"/>
+              </a:ext>
+            </a:extLst>
+          </p:cNvPr>
+          <p:cNvPicPr>
+            <a:picLocks noChangeAspect="1"/>
+          </p:cNvPicPr>
+          <p:nvPr/>
+        </p:nvPicPr>
+        <p:blipFill>
+          <a:blip r:embed="rId3"/>
+          <a:stretch>
+            <a:fillRect/>
+          </a:stretch>
+        </p:blipFill>
+        <p:spPr>
+          <a:xfrm>
+            <a:off x="3057525" y="4450081"/>
+            <a:ext cx="859993" cy="868680"/>
+          </a:xfrm>
+          <a:prstGeom prst="rect">
+            <a:avLst/>
+          </a:prstGeom>
+        </p:spPr>
+      </p:pic>
+      <p:pic>
+        <p:nvPicPr>
+          <p:cNvPr id="8" name="Grafik 7" descr="Würfel">
+            <a:extLst>
+              <a:ext uri="{FF2B5EF4-FFF2-40B4-BE49-F238E27FC236}">
+                <a16:creationId xmlns:a16="http://schemas.microsoft.com/office/drawing/2014/main" id="{667F3A66-1FFD-414E-9274-924104365CE5}"/>
+              </a:ext>
+            </a:extLst>
+          </p:cNvPr>
+          <p:cNvPicPr>
+            <a:picLocks noChangeAspect="1"/>
+          </p:cNvPicPr>
+          <p:nvPr/>
+        </p:nvPicPr>
+        <p:blipFill>
+          <a:blip r:embed="rId4">
+            <a:extLst>
+              <a:ext uri="{28A0092B-C50C-407E-A947-70E740481C1C}">
+                <a14:useLocalDpi xmlns:a14="http://schemas.microsoft.com/office/drawing/2010/main" val="0"/>
+              </a:ext>
+              <a:ext uri="{96DAC541-7B7A-43D3-8B79-37D633B846F1}">
+                <asvg:svgBlip xmlns:asvg="http://schemas.microsoft.com/office/drawing/2016/SVG/main" r:embed="rId5"/>
+              </a:ext>
+            </a:extLst>
+          </a:blip>
+          <a:stretch>
+            <a:fillRect/>
+          </a:stretch>
+        </p:blipFill>
+        <p:spPr>
+          <a:xfrm>
+            <a:off x="4788826" y="3040198"/>
+            <a:ext cx="1386147" cy="1386147"/>
+          </a:xfrm>
+          <a:prstGeom prst="rect">
+            <a:avLst/>
+          </a:prstGeom>
+        </p:spPr>
+      </p:pic>
+    </p:spTree>
+    <p:extLst>
+      <p:ext uri="{BB962C8B-B14F-4D97-AF65-F5344CB8AC3E}">
+        <p14:creationId xmlns:p14="http://schemas.microsoft.com/office/powerpoint/2010/main" val="1389800012"/>
+      </p:ext>
+    </p:extLst>
+  </p:cSld>
+  <p:clrMapOvr>
+    <a:masterClrMapping/>
+  </p:clrMapOvr>
+</p:sld>
+</file>
+
+<file path=ppt/slides/slide3.xml><?xml version="1.0" encoding="utf-8"?>
 <p:sld xmlns:a="http://schemas.openxmlformats.org/drawingml/2006/main" xmlns:r="http://schemas.openxmlformats.org/officeDocument/2006/relationships" xmlns:p="http://schemas.openxmlformats.org/presentationml/2006/main">
   <p:cSld>
     <p:spTree>

</xml_diff>